<commit_message>
Changed chapters, formulation of the problem
</commit_message>
<xml_diff>
--- a/prezentácia_diplomovka (2).pptx
+++ b/prezentácia_diplomovka (2).pptx
@@ -205,7 +205,7 @@
           <a:p>
             <a:fld id="{AC95D069-C5AE-47C3-B980-DF161E3F7BE4}" type="datetimeFigureOut">
               <a:rPr lang="en-US" smtClean="0"/>
-              <a:t>12/3/2023</a:t>
+              <a:t>12/7/2023</a:t>
             </a:fld>
             <a:endParaRPr lang="en-US"/>
           </a:p>
@@ -661,7 +661,7 @@
             <a:fld id="{B61BEF0D-F0BB-DE4B-95CE-6DB70DBA9567}" type="datetimeFigureOut">
               <a:rPr lang="en-US" smtClean="0"/>
               <a:pPr/>
-              <a:t>12/3/2023</a:t>
+              <a:t>12/7/2023</a:t>
             </a:fld>
             <a:endParaRPr lang="en-US" dirty="0"/>
           </a:p>
@@ -1001,7 +1001,7 @@
             <a:fld id="{B61BEF0D-F0BB-DE4B-95CE-6DB70DBA9567}" type="datetimeFigureOut">
               <a:rPr lang="en-US" smtClean="0"/>
               <a:pPr/>
-              <a:t>12/3/2023</a:t>
+              <a:t>12/7/2023</a:t>
             </a:fld>
             <a:endParaRPr lang="en-US" dirty="0"/>
           </a:p>
@@ -1404,7 +1404,7 @@
             <a:fld id="{B61BEF0D-F0BB-DE4B-95CE-6DB70DBA9567}" type="datetimeFigureOut">
               <a:rPr lang="en-US" smtClean="0"/>
               <a:pPr/>
-              <a:t>12/3/2023</a:t>
+              <a:t>12/7/2023</a:t>
             </a:fld>
             <a:endParaRPr lang="en-US" dirty="0"/>
           </a:p>
@@ -1742,7 +1742,7 @@
             <a:fld id="{B61BEF0D-F0BB-DE4B-95CE-6DB70DBA9567}" type="datetimeFigureOut">
               <a:rPr lang="en-US" smtClean="0"/>
               <a:pPr/>
-              <a:t>12/3/2023</a:t>
+              <a:t>12/7/2023</a:t>
             </a:fld>
             <a:endParaRPr lang="en-US" dirty="0"/>
           </a:p>
@@ -2064,7 +2064,7 @@
             <a:fld id="{B61BEF0D-F0BB-DE4B-95CE-6DB70DBA9567}" type="datetimeFigureOut">
               <a:rPr lang="en-US" smtClean="0"/>
               <a:pPr/>
-              <a:t>12/3/2023</a:t>
+              <a:t>12/7/2023</a:t>
             </a:fld>
             <a:endParaRPr lang="en-US" dirty="0"/>
           </a:p>
@@ -2462,7 +2462,7 @@
             <a:fld id="{B61BEF0D-F0BB-DE4B-95CE-6DB70DBA9567}" type="datetimeFigureOut">
               <a:rPr lang="en-US" smtClean="0"/>
               <a:pPr/>
-              <a:t>12/3/2023</a:t>
+              <a:t>12/7/2023</a:t>
             </a:fld>
             <a:endParaRPr lang="en-US" dirty="0"/>
           </a:p>
@@ -2721,7 +2721,7 @@
             <a:fld id="{B61BEF0D-F0BB-DE4B-95CE-6DB70DBA9567}" type="datetimeFigureOut">
               <a:rPr lang="en-US" smtClean="0"/>
               <a:pPr/>
-              <a:t>12/3/2023</a:t>
+              <a:t>12/7/2023</a:t>
             </a:fld>
             <a:endParaRPr lang="en-US" dirty="0"/>
           </a:p>
@@ -2985,7 +2985,7 @@
             <a:fld id="{B61BEF0D-F0BB-DE4B-95CE-6DB70DBA9567}" type="datetimeFigureOut">
               <a:rPr lang="en-US" smtClean="0"/>
               <a:pPr/>
-              <a:t>12/3/2023</a:t>
+              <a:t>12/7/2023</a:t>
             </a:fld>
             <a:endParaRPr lang="en-US" dirty="0"/>
           </a:p>
@@ -3249,7 +3249,7 @@
             <a:fld id="{B61BEF0D-F0BB-DE4B-95CE-6DB70DBA9567}" type="datetimeFigureOut">
               <a:rPr lang="en-US" smtClean="0"/>
               <a:pPr/>
-              <a:t>12/3/2023</a:t>
+              <a:t>12/7/2023</a:t>
             </a:fld>
             <a:endParaRPr lang="en-US" dirty="0"/>
           </a:p>
@@ -3580,7 +3580,7 @@
             <a:fld id="{B61BEF0D-F0BB-DE4B-95CE-6DB70DBA9567}" type="datetimeFigureOut">
               <a:rPr lang="en-US" smtClean="0"/>
               <a:pPr/>
-              <a:t>12/3/2023</a:t>
+              <a:t>12/7/2023</a:t>
             </a:fld>
             <a:endParaRPr lang="en-US" dirty="0"/>
           </a:p>
@@ -3905,7 +3905,7 @@
             <a:fld id="{B61BEF0D-F0BB-DE4B-95CE-6DB70DBA9567}" type="datetimeFigureOut">
               <a:rPr lang="en-US" smtClean="0"/>
               <a:pPr/>
-              <a:t>12/3/2023</a:t>
+              <a:t>12/7/2023</a:t>
             </a:fld>
             <a:endParaRPr lang="en-US" dirty="0"/>
           </a:p>
@@ -4364,7 +4364,7 @@
             <a:fld id="{B61BEF0D-F0BB-DE4B-95CE-6DB70DBA9567}" type="datetimeFigureOut">
               <a:rPr lang="en-US" smtClean="0"/>
               <a:pPr/>
-              <a:t>12/3/2023</a:t>
+              <a:t>12/7/2023</a:t>
             </a:fld>
             <a:endParaRPr lang="en-US" dirty="0"/>
           </a:p>
@@ -4571,7 +4571,7 @@
             <a:fld id="{B61BEF0D-F0BB-DE4B-95CE-6DB70DBA9567}" type="datetimeFigureOut">
               <a:rPr lang="en-US" smtClean="0"/>
               <a:pPr/>
-              <a:t>12/3/2023</a:t>
+              <a:t>12/7/2023</a:t>
             </a:fld>
             <a:endParaRPr lang="en-US" dirty="0"/>
           </a:p>
@@ -4750,7 +4750,7 @@
             <a:fld id="{B61BEF0D-F0BB-DE4B-95CE-6DB70DBA9567}" type="datetimeFigureOut">
               <a:rPr lang="en-US" smtClean="0"/>
               <a:pPr/>
-              <a:t>12/3/2023</a:t>
+              <a:t>12/7/2023</a:t>
             </a:fld>
             <a:endParaRPr lang="en-US" dirty="0"/>
           </a:p>
@@ -5085,7 +5085,7 @@
             <a:fld id="{B61BEF0D-F0BB-DE4B-95CE-6DB70DBA9567}" type="datetimeFigureOut">
               <a:rPr lang="en-US" smtClean="0"/>
               <a:pPr/>
-              <a:t>12/3/2023</a:t>
+              <a:t>12/7/2023</a:t>
             </a:fld>
             <a:endParaRPr lang="en-US" dirty="0"/>
           </a:p>
@@ -5432,7 +5432,7 @@
             <a:fld id="{B61BEF0D-F0BB-DE4B-95CE-6DB70DBA9567}" type="datetimeFigureOut">
               <a:rPr lang="en-US" smtClean="0"/>
               <a:pPr/>
-              <a:t>12/3/2023</a:t>
+              <a:t>12/7/2023</a:t>
             </a:fld>
             <a:endParaRPr lang="en-US" dirty="0"/>
           </a:p>
@@ -7551,7 +7551,7 @@
             <a:fld id="{B61BEF0D-F0BB-DE4B-95CE-6DB70DBA9567}" type="datetimeFigureOut">
               <a:rPr lang="en-US" smtClean="0"/>
               <a:pPr/>
-              <a:t>12/3/2023</a:t>
+              <a:t>12/7/2023</a:t>
             </a:fld>
             <a:endParaRPr lang="en-US" dirty="0"/>
           </a:p>
@@ -10691,7 +10691,7 @@
         <p:spPr/>
         <p:txBody>
           <a:bodyPr>
-            <a:normAutofit/>
+            <a:normAutofit fontScale="92500" lnSpcReduction="10000"/>
           </a:bodyPr>
           <a:lstStyle/>
           <a:p>
@@ -10709,16 +10709,57 @@
             </a:r>
             <a:r>
               <a:rPr lang="sk-SK" dirty="0"/>
-              <a:t> riešenia úlohy je nájdenie optimálneho rozvrhu (</a:t>
-            </a:r>
-            <a:r>
-              <a:rPr lang="sk-SK" dirty="0" err="1"/>
-              <a:t>schedulu</a:t>
-            </a:r>
-            <a:r>
-              <a:rPr lang="sk-SK" dirty="0"/>
-              <a:t>) nabíjania elektrických áut.</a:t>
-            </a:r>
+              <a:t> riešenia úlohy je </a:t>
+            </a:r>
+            <a:r>
+              <a:rPr lang="en-GB" dirty="0" err="1"/>
+              <a:t>optimalizovanie</a:t>
+            </a:r>
+            <a:r>
+              <a:rPr lang="en-GB" dirty="0"/>
+              <a:t> </a:t>
+            </a:r>
+            <a:r>
+              <a:rPr lang="en-GB" dirty="0" err="1"/>
+              <a:t>toku</a:t>
+            </a:r>
+            <a:r>
+              <a:rPr lang="en-GB" dirty="0"/>
+              <a:t> </a:t>
+            </a:r>
+            <a:r>
+              <a:rPr lang="en-GB" dirty="0" err="1"/>
+              <a:t>elektrickej</a:t>
+            </a:r>
+            <a:r>
+              <a:rPr lang="en-GB" dirty="0"/>
+              <a:t> </a:t>
+            </a:r>
+            <a:r>
+              <a:rPr lang="en-GB" dirty="0" err="1"/>
+              <a:t>energie</a:t>
+            </a:r>
+            <a:r>
+              <a:rPr lang="en-GB" dirty="0"/>
+              <a:t> </a:t>
+            </a:r>
+            <a:r>
+              <a:rPr lang="en-GB" dirty="0" err="1"/>
+              <a:t>pridelovanej</a:t>
+            </a:r>
+            <a:r>
+              <a:rPr lang="en-GB" dirty="0"/>
+              <a:t> </a:t>
+            </a:r>
+            <a:r>
+              <a:rPr lang="en-GB" dirty="0" err="1"/>
+              <a:t>elektromobilom</a:t>
+            </a:r>
+            <a:r>
+              <a:rPr lang="en-GB" dirty="0"/>
+              <a:t>. </a:t>
+            </a:r>
+            <a:endParaRPr lang="sk-SK" dirty="0"/>
           </a:p>
           <a:p>
             <a:pPr>
@@ -10727,7 +10768,7 @@
             </a:pPr>
             <a:r>
               <a:rPr lang="sk-SK" dirty="0"/>
-              <a:t> Existujú viaceré algoritmy na riešenie tejto čiastkovej úlohy ako napríklad </a:t>
+              <a:t>Existujú viaceré algoritmy na riešenie tejto čiastkovej úlohy ako napríklad </a:t>
             </a:r>
             <a:r>
               <a:rPr lang="sk-SK" dirty="0" err="1"/>
@@ -10799,7 +10840,7 @@
             </a:r>
             <a:r>
               <a:rPr lang="en-GB" dirty="0"/>
-              <a:t> </a:t>
+              <a:t> (RR) </a:t>
             </a:r>
             <a:r>
               <a:rPr lang="sk-SK" dirty="0"/>
@@ -10814,7 +10855,19 @@
             </a:pPr>
             <a:r>
               <a:rPr lang="sk-SK" dirty="0"/>
-              <a:t>My tento čiastkový problém riešime pomocou algoritmu </a:t>
+              <a:t>My tento čiastkový problém riešime pomocou </a:t>
+            </a:r>
+            <a:r>
+              <a:rPr lang="sk-SK" dirty="0" err="1"/>
+              <a:t>algoritm</a:t>
+            </a:r>
+            <a:r>
+              <a:rPr lang="en-GB" dirty="0" err="1"/>
+              <a:t>ov</a:t>
+            </a:r>
+            <a:r>
+              <a:rPr lang="sk-SK" dirty="0"/>
+              <a:t> </a:t>
             </a:r>
             <a:r>
               <a:rPr lang="sk-SK" dirty="0" err="1"/>
@@ -10835,6 +10888,18 @@
             <a:r>
               <a:rPr lang="sk-SK" dirty="0" err="1"/>
               <a:t>First</a:t>
+            </a:r>
+            <a:r>
+              <a:rPr lang="en-GB" dirty="0"/>
+              <a:t>, Earliest Deadline First, Shortest Job Next, First-Come First-Served </a:t>
+            </a:r>
+            <a:r>
+              <a:rPr lang="sk-SK" dirty="0"/>
+              <a:t>a </a:t>
+            </a:r>
+            <a:r>
+              <a:rPr lang="sk-SK" dirty="0" err="1"/>
+              <a:t>ďaľších</a:t>
             </a:r>
             <a:r>
               <a:rPr lang="sk-SK" dirty="0"/>
@@ -10847,109 +10912,74 @@
               <a:buChar char="§"/>
             </a:pPr>
             <a:r>
+              <a:rPr lang="en-GB" dirty="0" err="1"/>
+              <a:t>Pou</a:t>
+            </a:r>
+            <a:r>
               <a:rPr lang="sk-SK" dirty="0" err="1"/>
-              <a:t>Least</a:t>
+              <a:t>žívame</a:t>
             </a:r>
             <a:r>
               <a:rPr lang="sk-SK" dirty="0"/>
+              <a:t> online algoritmy, takže nemáme žiadne informácie o budúcich príchodoch elektromobilov. </a:t>
+            </a:r>
+          </a:p>
+          <a:p>
+            <a:pPr>
+              <a:buFont typeface="Wingdings" panose="05000000000000000000" pitchFamily="2" charset="2"/>
+              <a:buChar char="§"/>
+            </a:pPr>
+            <a:r>
+              <a:rPr lang="sk-SK" dirty="0"/>
+              <a:t>Koľko energie môžeme elektromobilom prideľovať závisí od riešenia </a:t>
+            </a:r>
+            <a:r>
+              <a:rPr lang="en-GB" dirty="0" err="1"/>
+              <a:t>optimaliza</a:t>
+            </a:r>
+            <a:r>
+              <a:rPr lang="sk-SK" dirty="0"/>
+              <a:t>č</a:t>
+            </a:r>
+            <a:r>
+              <a:rPr lang="en-GB" dirty="0" err="1"/>
+              <a:t>neho</a:t>
+            </a:r>
+            <a:r>
+              <a:rPr lang="en-GB" dirty="0"/>
               <a:t> </a:t>
             </a:r>
             <a:r>
+              <a:rPr lang="en-GB" dirty="0" err="1"/>
+              <a:t>problemu</a:t>
+            </a:r>
+            <a:r>
+              <a:rPr lang="en-GB" dirty="0"/>
+              <a:t> </a:t>
+            </a:r>
+            <a:r>
+              <a:rPr lang="sk-SK" dirty="0"/>
+              <a:t>dodania maximálnej energie elektromobilom pri zachovaní obmedzení infraštruktúry nabíjacej siete.</a:t>
+            </a:r>
+          </a:p>
+          <a:p>
+            <a:pPr>
+              <a:buFont typeface="Wingdings" panose="05000000000000000000" pitchFamily="2" charset="2"/>
+              <a:buChar char="§"/>
+            </a:pPr>
+            <a:r>
+              <a:rPr lang="sk-SK" dirty="0"/>
+              <a:t>Riešime tento optimalizačný problém pomocou lineárneho vyhľadávania. Existujúce riešenia riešia tento problém pomocou metódy </a:t>
+            </a:r>
+            <a:r>
               <a:rPr lang="sk-SK" dirty="0" err="1"/>
-              <a:t>Laxity</a:t>
-            </a:r>
-            <a:r>
-              <a:rPr lang="sk-SK" dirty="0"/>
-              <a:t> </a:t>
-            </a:r>
-            <a:r>
-              <a:rPr lang="sk-SK" dirty="0" err="1"/>
-              <a:t>First</a:t>
-            </a:r>
-            <a:r>
-              <a:rPr lang="sk-SK" dirty="0"/>
-              <a:t> funguje tak, že pre každé auto vypočíta jeho </a:t>
-            </a:r>
-            <a:r>
-              <a:rPr lang="sk-SK" dirty="0" err="1"/>
-              <a:t>laxitu</a:t>
-            </a:r>
-            <a:r>
-              <a:rPr lang="sk-SK" dirty="0"/>
-              <a:t> </a:t>
+              <a:t>bisekcie</a:t>
             </a:r>
             <a:r>
               <a:rPr lang="en-GB" dirty="0"/>
-              <a:t>= </a:t>
-            </a:r>
-            <a:r>
-              <a:rPr lang="sk-SK" dirty="0"/>
-              <a:t> zostávajúci čas na nabíjanie </a:t>
-            </a:r>
-            <a:r>
-              <a:rPr lang="en-GB" dirty="0"/>
-              <a:t>– po</a:t>
-            </a:r>
-            <a:r>
-              <a:rPr lang="sk-SK" dirty="0" err="1"/>
-              <a:t>žadované</a:t>
-            </a:r>
-            <a:r>
-              <a:rPr lang="sk-SK" dirty="0"/>
-              <a:t> množstvo energie</a:t>
-            </a:r>
-            <a:r>
-              <a:rPr lang="en-GB" dirty="0"/>
-              <a:t>/maxim</a:t>
-            </a:r>
-            <a:r>
-              <a:rPr lang="sk-SK" dirty="0" err="1"/>
-              <a:t>álna</a:t>
-            </a:r>
-            <a:r>
-              <a:rPr lang="sk-SK" dirty="0"/>
-              <a:t> rýchlosť nabíjania. </a:t>
-            </a:r>
-            <a:r>
-              <a:rPr lang="sk-SK" dirty="0" err="1"/>
-              <a:t>Least</a:t>
-            </a:r>
-            <a:r>
-              <a:rPr lang="sk-SK" dirty="0"/>
-              <a:t> </a:t>
-            </a:r>
-            <a:r>
-              <a:rPr lang="sk-SK" dirty="0" err="1"/>
-              <a:t>Laxity</a:t>
-            </a:r>
-            <a:r>
-              <a:rPr lang="sk-SK" dirty="0"/>
-              <a:t> </a:t>
-            </a:r>
-            <a:r>
-              <a:rPr lang="sk-SK" dirty="0" err="1"/>
-              <a:t>First</a:t>
-            </a:r>
-            <a:r>
-              <a:rPr lang="sk-SK" dirty="0"/>
-              <a:t> algoritmus postupne prideľuje energiu elektrickým autám od najnižšej </a:t>
-            </a:r>
-            <a:r>
-              <a:rPr lang="sk-SK" dirty="0" err="1"/>
-              <a:t>laxity</a:t>
-            </a:r>
-            <a:r>
-              <a:rPr lang="sk-SK" dirty="0"/>
-              <a:t> po najvyššiu </a:t>
-            </a:r>
-            <a:r>
-              <a:rPr lang="sk-SK" dirty="0" err="1"/>
-              <a:t>laxitu</a:t>
-            </a:r>
-            <a:r>
-              <a:rPr lang="sk-SK" dirty="0"/>
               <a:t>.</a:t>
             </a:r>
+            <a:endParaRPr lang="sk-SK" dirty="0"/>
           </a:p>
           <a:p>
             <a:pPr marL="0" indent="0">
@@ -11036,10 +11066,15 @@
             <p:ph idx="1"/>
           </p:nvPr>
         </p:nvSpPr>
-        <p:spPr/>
+        <p:spPr>
+          <a:xfrm>
+            <a:off x="2589212" y="1447292"/>
+            <a:ext cx="8915400" cy="3777622"/>
+          </a:xfrm>
+        </p:spPr>
         <p:txBody>
           <a:bodyPr>
-            <a:normAutofit fontScale="92500" lnSpcReduction="10000"/>
+            <a:normAutofit lnSpcReduction="10000"/>
           </a:bodyPr>
           <a:lstStyle/>
           <a:p>
@@ -11049,32 +11084,69 @@
             </a:pPr>
             <a:r>
               <a:rPr lang="sk-SK" dirty="0"/>
-              <a:t>Najskôr vypočítame </a:t>
+              <a:t>Všetky </a:t>
+            </a:r>
+            <a:r>
+              <a:rPr lang="en-GB" dirty="0"/>
+              <a:t>online</a:t>
+            </a:r>
+            <a:r>
+              <a:rPr lang="sk-SK" dirty="0"/>
+              <a:t> </a:t>
             </a:r>
             <a:r>
               <a:rPr lang="sk-SK" dirty="0" err="1"/>
-              <a:t>laxitu</a:t>
+              <a:t>scheduling</a:t>
+            </a:r>
+            <a:r>
+              <a:rPr lang="en-GB" dirty="0"/>
+              <a:t> </a:t>
             </a:r>
             <a:r>
               <a:rPr lang="sk-SK" dirty="0"/>
-              <a:t> pre každé elektrické auto. Potom následne </a:t>
+              <a:t>algoritmy</a:t>
+            </a:r>
+            <a:r>
+              <a:rPr lang="en-GB" dirty="0"/>
+              <a:t>, </a:t>
+            </a:r>
+            <a:r>
+              <a:rPr lang="en-GB" dirty="0" err="1"/>
+              <a:t>ktor</a:t>
+            </a:r>
+            <a:r>
+              <a:rPr lang="sk-SK" dirty="0"/>
+              <a:t>é implementujeme najskôr utriedia aktívne elektromobily na základe ich určitej vlastnosti </a:t>
+            </a:r>
+            <a:r>
+              <a:rPr lang="en-GB" dirty="0"/>
+              <a:t>(</a:t>
+            </a:r>
+            <a:r>
+              <a:rPr lang="en-GB" dirty="0" err="1"/>
+              <a:t>napr</a:t>
+            </a:r>
+            <a:r>
+              <a:rPr lang="en-GB" dirty="0"/>
+              <a:t> laxity, </a:t>
+            </a:r>
+            <a:r>
+              <a:rPr lang="sk-SK" dirty="0"/>
+              <a:t>čas odchodu </a:t>
             </a:r>
             <a:r>
               <a:rPr lang="sk-SK" dirty="0" err="1"/>
-              <a:t>pridelujeme</a:t>
+              <a:t>atď</a:t>
+            </a:r>
+            <a:r>
+              <a:rPr lang="en-GB" dirty="0"/>
+              <a:t>)</a:t>
             </a:r>
             <a:r>
               <a:rPr lang="sk-SK" dirty="0"/>
-              <a:t> energiu autám na základe ich </a:t>
-            </a:r>
-            <a:r>
-              <a:rPr lang="sk-SK" dirty="0" err="1"/>
-              <a:t>laxity</a:t>
-            </a:r>
-            <a:r>
-              <a:rPr lang="sk-SK" dirty="0"/>
-              <a:t>. Dostaneme viacero možných rozvrhov nabíjania energie. </a:t>
-            </a:r>
+              <a:t>.</a:t>
+            </a:r>
+            <a:endParaRPr lang="en-GB" dirty="0"/>
           </a:p>
           <a:p>
             <a:pPr>
@@ -11082,8 +11154,28 @@
               <a:buChar char="§"/>
             </a:pPr>
             <a:r>
+              <a:rPr lang="en-GB" dirty="0"/>
+              <a:t>N</a:t>
+            </a:r>
+            <a:r>
+              <a:rPr lang="sk-SK" dirty="0" err="1"/>
+              <a:t>ásledne</a:t>
+            </a:r>
+            <a:r>
               <a:rPr lang="sk-SK" dirty="0"/>
-              <a:t>Optimálny rozvrh nabíjania nájdeme tak, že porovnáme celkové ceny za energiu všetkých rozvrhov nabíjania a ten rozvrh s najnižšími nákladmi bude optimálny rozvrh.</a:t>
+              <a:t> dodávame elektromobilom energiu v tom poradí. Pri každom pridelení sa skúša, či je možné prideliť</a:t>
+            </a:r>
+            <a:r>
+              <a:rPr lang="en-GB" dirty="0"/>
+              <a:t> maxim</a:t>
+            </a:r>
+            <a:r>
+              <a:rPr lang="sk-SK" dirty="0" err="1"/>
+              <a:t>álne</a:t>
+            </a:r>
+            <a:r>
+              <a:rPr lang="sk-SK" dirty="0"/>
+              <a:t> množstvo energie. </a:t>
             </a:r>
           </a:p>
           <a:p>
@@ -11093,68 +11185,66 @@
             </a:pPr>
             <a:r>
               <a:rPr lang="sk-SK" dirty="0"/>
-              <a:t>Zistíme , že </a:t>
-            </a:r>
+              <a:t>Ak nie, potom sa rieši optimalizačný problém dodania maximálnej energie elektromobilu pri zachovaní obmedzení infraštruktúry. </a:t>
+            </a:r>
+          </a:p>
+          <a:p>
+            <a:pPr>
+              <a:buFont typeface="Wingdings" panose="05000000000000000000" pitchFamily="2" charset="2"/>
+              <a:buChar char="§"/>
+            </a:pPr>
+            <a:r>
+              <a:rPr lang="sk-SK" dirty="0"/>
+              <a:t>Potom použijeme metódu lineárneho vyhľadávania na riešenie optimalizačného problému</a:t>
+            </a:r>
+            <a:r>
+              <a:rPr lang="en-GB" dirty="0"/>
+              <a:t>.</a:t>
+            </a:r>
+            <a:endParaRPr lang="sk-SK" dirty="0"/>
+          </a:p>
+          <a:p>
+            <a:pPr>
+              <a:buFont typeface="Wingdings" panose="05000000000000000000" pitchFamily="2" charset="2"/>
+              <a:buChar char="§"/>
+            </a:pPr>
+            <a:r>
+              <a:rPr lang="sk-SK" dirty="0"/>
+              <a:t>Riešenia čiastkového problému pozostáva z celkovej dodanej energie, celkovej ceny za energiu a </a:t>
+            </a:r>
+            <a:r>
+              <a:rPr lang="sk-SK" dirty="0" err="1"/>
+              <a:t>dalších</a:t>
+            </a:r>
+            <a:r>
+              <a:rPr lang="sk-SK" dirty="0"/>
+              <a:t> parametrov.</a:t>
+            </a:r>
+            <a:endParaRPr lang="en-GB" dirty="0"/>
+          </a:p>
+          <a:p>
+            <a:pPr>
+              <a:buFont typeface="Wingdings" panose="05000000000000000000" pitchFamily="2" charset="2"/>
+              <a:buChar char="§"/>
+            </a:pPr>
             <a:r>
               <a:rPr lang="en-GB" dirty="0" err="1"/>
-              <a:t>na</a:t>
-            </a:r>
-            <a:r>
-              <a:rPr lang="en-GB" dirty="0"/>
-              <a:t> </a:t>
+              <a:t>Pr</a:t>
+            </a:r>
+            <a:r>
+              <a:rPr lang="sk-SK" dirty="0" err="1"/>
+              <a:t>íklad</a:t>
             </a:r>
             <a:r>
               <a:rPr lang="sk-SK" dirty="0"/>
-              <a:t> </a:t>
-            </a:r>
-            <a:r>
-              <a:rPr lang="sk-SK" dirty="0" err="1"/>
-              <a:t>ľavo</a:t>
-            </a:r>
-            <a:r>
-              <a:rPr lang="sk-SK" dirty="0"/>
-              <a:t> je</a:t>
-            </a:r>
-            <a:r>
-              <a:rPr lang="en-GB" dirty="0"/>
-              <a:t> </a:t>
-            </a:r>
-            <a:r>
-              <a:rPr lang="sk-SK" dirty="0"/>
-              <a:t>optimálny rozvrh </a:t>
-            </a:r>
-            <a:r>
-              <a:rPr lang="en-GB" dirty="0"/>
-              <a:t>(</a:t>
-            </a:r>
-            <a:r>
-              <a:rPr lang="en-GB" dirty="0" err="1"/>
-              <a:t>cena</a:t>
-            </a:r>
-            <a:r>
-              <a:rPr lang="en-GB" dirty="0"/>
-              <a:t> = 33) a </a:t>
-            </a:r>
-            <a:r>
-              <a:rPr lang="sk-SK" dirty="0"/>
-              <a:t>napravo nie je optimálny </a:t>
-            </a:r>
-            <a:r>
-              <a:rPr lang="en-GB" dirty="0"/>
-              <a:t>(</a:t>
-            </a:r>
-            <a:r>
-              <a:rPr lang="en-GB" dirty="0" err="1"/>
-              <a:t>cena</a:t>
-            </a:r>
-            <a:r>
-              <a:rPr lang="en-GB" dirty="0"/>
-              <a:t> = 47) </a:t>
-            </a:r>
-            <a:r>
-              <a:rPr lang="sk-SK" dirty="0"/>
-              <a:t>:</a:t>
-            </a:r>
+              <a:t> výstupu:</a:t>
+            </a:r>
+          </a:p>
+          <a:p>
+            <a:pPr marL="0" indent="0">
+              <a:buNone/>
+            </a:pPr>
+            <a:endParaRPr lang="sk-SK" dirty="0"/>
           </a:p>
           <a:p>
             <a:pPr>
@@ -11171,37 +11261,26 @@
             <a:endParaRPr lang="sk-SK" dirty="0"/>
           </a:p>
           <a:p>
+            <a:pPr marL="0" indent="0">
+              <a:buNone/>
+            </a:pPr>
+            <a:endParaRPr lang="sk-SK" dirty="0"/>
+          </a:p>
+          <a:p>
             <a:pPr>
               <a:buFont typeface="Wingdings" panose="05000000000000000000" pitchFamily="2" charset="2"/>
               <a:buChar char="§"/>
             </a:pPr>
             <a:endParaRPr lang="sk-SK" dirty="0"/>
           </a:p>
-          <a:p>
-            <a:pPr>
-              <a:buFont typeface="Wingdings" panose="05000000000000000000" pitchFamily="2" charset="2"/>
-              <a:buChar char="§"/>
-            </a:pPr>
-            <a:r>
-              <a:rPr lang="sk-SK" dirty="0"/>
-              <a:t>:</a:t>
-            </a:r>
-          </a:p>
-          <a:p>
-            <a:pPr>
-              <a:buFont typeface="Wingdings" panose="05000000000000000000" pitchFamily="2" charset="2"/>
-              <a:buChar char="§"/>
-            </a:pPr>
-            <a:endParaRPr lang="sk-SK" dirty="0"/>
-          </a:p>
         </p:txBody>
       </p:sp>
       <p:pic>
         <p:nvPicPr>
-          <p:cNvPr id="5" name="Obrázok 4" descr="Obrázok, na ktorom je text, číslo, písmo, snímka obrazovky&#10;&#10;Automaticky generovaný popis">
+          <p:cNvPr id="5" name="Obrázok 4" descr="Obrázok, na ktorom je text, snímka obrazovky, písmo, číslo&#10;&#10;Automaticky generovaný popis">
             <a:extLst>
               <a:ext uri="{FF2B5EF4-FFF2-40B4-BE49-F238E27FC236}">
-                <a16:creationId xmlns:a16="http://schemas.microsoft.com/office/drawing/2014/main" id="{4567DB37-8B76-6FB6-EA48-54B3B73E6145}"/>
+                <a16:creationId xmlns:a16="http://schemas.microsoft.com/office/drawing/2014/main" id="{83A3CBC0-917B-EE8E-FCF0-10AFD87FBD0D}"/>
               </a:ext>
             </a:extLst>
           </p:cNvPr>
@@ -11218,38 +11297,8 @@
         </p:blipFill>
         <p:spPr>
           <a:xfrm>
-            <a:off x="975360" y="4439650"/>
-            <a:ext cx="5361807" cy="2208378"/>
-          </a:xfrm>
-          <a:prstGeom prst="rect">
-            <a:avLst/>
-          </a:prstGeom>
-        </p:spPr>
-      </p:pic>
-      <p:pic>
-        <p:nvPicPr>
-          <p:cNvPr id="7" name="Obrázok 6" descr="Obrázok, na ktorom je text, číslo, písmo, snímka obrazovky&#10;&#10;Automaticky generovaný popis">
-            <a:extLst>
-              <a:ext uri="{FF2B5EF4-FFF2-40B4-BE49-F238E27FC236}">
-                <a16:creationId xmlns:a16="http://schemas.microsoft.com/office/drawing/2014/main" id="{E9ADDD88-6976-F0EF-29C3-6F2FAA5CBC3C}"/>
-              </a:ext>
-            </a:extLst>
-          </p:cNvPr>
-          <p:cNvPicPr>
-            <a:picLocks noChangeAspect="1"/>
-          </p:cNvPicPr>
-          <p:nvPr/>
-        </p:nvPicPr>
-        <p:blipFill>
-          <a:blip r:embed="rId3"/>
-          <a:stretch>
-            <a:fillRect/>
-          </a:stretch>
-        </p:blipFill>
-        <p:spPr>
-          <a:xfrm>
-            <a:off x="6678328" y="4361758"/>
-            <a:ext cx="4985352" cy="2286270"/>
+            <a:off x="3052722" y="5075434"/>
+            <a:ext cx="7346023" cy="1782566"/>
           </a:xfrm>
           <a:prstGeom prst="rect">
             <a:avLst/>
@@ -11341,7 +11390,15 @@
             </a:pPr>
             <a:r>
               <a:rPr lang="sk-SK" dirty="0"/>
-              <a:t>Doteraz sa nám podarilo zistiť viacero rozvrhov nabíjania energie elektrických áut. Vieme</a:t>
+              <a:t>Doteraz sa nám podarilo implementovať veľa online </a:t>
+            </a:r>
+            <a:r>
+              <a:rPr lang="en-GB" dirty="0"/>
+              <a:t>scheduling </a:t>
+            </a:r>
+            <a:r>
+              <a:rPr lang="sk-SK" dirty="0"/>
+              <a:t>algoritmov</a:t>
             </a:r>
             <a:r>
               <a:rPr lang="en-GB" dirty="0"/>
@@ -11349,36 +11406,33 @@
             </a:r>
             <a:r>
               <a:rPr lang="en-GB" dirty="0" err="1"/>
-              <a:t>pomocou</a:t>
+              <a:t>vyu</a:t>
+            </a:r>
+            <a:r>
+              <a:rPr lang="sk-SK" dirty="0" err="1"/>
+              <a:t>žívajúcich</a:t>
+            </a:r>
+            <a:r>
+              <a:rPr lang="sk-SK" dirty="0"/>
+              <a:t> lineárne vyhľadávanie</a:t>
+            </a:r>
+            <a:r>
+              <a:rPr lang="en-GB" dirty="0"/>
+              <a:t> a </a:t>
+            </a:r>
+            <a:r>
+              <a:rPr lang="en-GB" dirty="0" err="1"/>
+              <a:t>porovna</a:t>
+            </a:r>
+            <a:r>
+              <a:rPr lang="sk-SK" dirty="0"/>
+              <a:t>ť ich s doterajšími riešeniami.</a:t>
             </a:r>
             <a:r>
               <a:rPr lang="en-GB" dirty="0"/>
               <a:t> </a:t>
             </a:r>
-            <a:r>
-              <a:rPr lang="en-GB" dirty="0" err="1"/>
-              <a:t>porovnania</a:t>
-            </a:r>
-            <a:r>
-              <a:rPr lang="en-GB" dirty="0"/>
-              <a:t> ich </a:t>
-            </a:r>
-            <a:r>
-              <a:rPr lang="sk-SK" dirty="0"/>
-              <a:t>celkových </a:t>
-            </a:r>
-            <a:r>
-              <a:rPr lang="en-GB" dirty="0"/>
-              <a:t>n</a:t>
-            </a:r>
-            <a:r>
-              <a:rPr lang="sk-SK" dirty="0" err="1"/>
-              <a:t>ákladov</a:t>
-            </a:r>
-            <a:r>
-              <a:rPr lang="sk-SK" dirty="0"/>
-              <a:t> získať optimálny rozvrh nabíjania áut.</a:t>
-            </a:r>
+            <a:endParaRPr lang="sk-SK" dirty="0"/>
           </a:p>
           <a:p>
             <a:pPr>
@@ -11387,8 +11441,67 @@
             </a:pPr>
             <a:r>
               <a:rPr lang="sk-SK" dirty="0"/>
-              <a:t>Výstup programu je plán nabíjania optimálneho modelu a aj jeho plán platieb za energiu. Program a iné veci k práci sú dostupné na stránke: https://omar-687.github.io/diplomovka/</a:t>
-            </a:r>
+              <a:t>Výstup programu je množstvo dodanej energie, cena a </a:t>
+            </a:r>
+            <a:r>
+              <a:rPr lang="sk-SK" dirty="0" err="1"/>
+              <a:t>dalšie</a:t>
+            </a:r>
+            <a:r>
+              <a:rPr lang="sk-SK" dirty="0"/>
+              <a:t> parametre plánu nabíjania. </a:t>
+            </a:r>
+            <a:r>
+              <a:rPr lang="en-GB" dirty="0" err="1"/>
+              <a:t>Odkaz</a:t>
+            </a:r>
+            <a:r>
+              <a:rPr lang="en-GB" dirty="0"/>
+              <a:t> </a:t>
+            </a:r>
+            <a:r>
+              <a:rPr lang="en-GB" dirty="0" err="1"/>
+              <a:t>na</a:t>
+            </a:r>
+            <a:r>
+              <a:rPr lang="en-GB" dirty="0"/>
+              <a:t> program a </a:t>
+            </a:r>
+            <a:r>
+              <a:rPr lang="en-GB" dirty="0" err="1"/>
+              <a:t>diplomovku</a:t>
+            </a:r>
+            <a:r>
+              <a:rPr lang="en-GB" dirty="0"/>
+              <a:t> </a:t>
+            </a:r>
+            <a:r>
+              <a:rPr lang="en-GB" dirty="0" err="1"/>
+              <a:t>sa</a:t>
+            </a:r>
+            <a:r>
+              <a:rPr lang="en-GB" dirty="0"/>
+              <a:t> </a:t>
+            </a:r>
+            <a:r>
+              <a:rPr lang="en-GB" dirty="0" err="1"/>
+              <a:t>nach</a:t>
+            </a:r>
+            <a:r>
+              <a:rPr lang="sk-SK" dirty="0" err="1"/>
+              <a:t>ádza</a:t>
+            </a:r>
+            <a:r>
+              <a:rPr lang="sk-SK" dirty="0"/>
+              <a:t> na stránke: </a:t>
+            </a:r>
+            <a:r>
+              <a:rPr lang="sk-SK" dirty="0">
+                <a:hlinkClick r:id="rId2"/>
+              </a:rPr>
+              <a:t>https://omar-687.github.io/diplomovka/</a:t>
+            </a:r>
+            <a:endParaRPr lang="en-GB" dirty="0"/>
           </a:p>
           <a:p>
             <a:endParaRPr lang="sk-SK" dirty="0"/>
@@ -11397,40 +11510,10 @@
       </p:sp>
       <p:pic>
         <p:nvPicPr>
-          <p:cNvPr id="5" name="Obrázok 4" descr="Obrázok, na ktorom je text, snímka obrazovky, diagram, vývoj&#10;&#10;Automaticky generovaný popis">
+          <p:cNvPr id="5" name="Obrázok 4" descr="Obrázok, na ktorom je text, snímka obrazovky, číslo, rad&#10;&#10;Automaticky generovaný popis">
             <a:extLst>
               <a:ext uri="{FF2B5EF4-FFF2-40B4-BE49-F238E27FC236}">
-                <a16:creationId xmlns:a16="http://schemas.microsoft.com/office/drawing/2014/main" id="{8338B713-D7C9-34C2-D637-24B7B6ADB159}"/>
-              </a:ext>
-            </a:extLst>
-          </p:cNvPr>
-          <p:cNvPicPr>
-            <a:picLocks noChangeAspect="1"/>
-          </p:cNvPicPr>
-          <p:nvPr/>
-        </p:nvPicPr>
-        <p:blipFill>
-          <a:blip r:embed="rId2"/>
-          <a:stretch>
-            <a:fillRect/>
-          </a:stretch>
-        </p:blipFill>
-        <p:spPr>
-          <a:xfrm>
-            <a:off x="6508458" y="4129238"/>
-            <a:ext cx="5683542" cy="2728762"/>
-          </a:xfrm>
-          <a:prstGeom prst="rect">
-            <a:avLst/>
-          </a:prstGeom>
-        </p:spPr>
-      </p:pic>
-      <p:pic>
-        <p:nvPicPr>
-          <p:cNvPr id="9" name="Obrázok 8" descr="Obrázok, na ktorom je text, snímka obrazovky, diagram, vývoj&#10;&#10;Automaticky generovaný popis">
-            <a:extLst>
-              <a:ext uri="{FF2B5EF4-FFF2-40B4-BE49-F238E27FC236}">
-                <a16:creationId xmlns:a16="http://schemas.microsoft.com/office/drawing/2014/main" id="{E154C32E-86FD-32DF-E2CB-19DA709AF4F8}"/>
+                <a16:creationId xmlns:a16="http://schemas.microsoft.com/office/drawing/2014/main" id="{4888A875-9EFF-30FA-1BAB-329B472A1416}"/>
               </a:ext>
             </a:extLst>
           </p:cNvPr>
@@ -11447,8 +11530,38 @@
         </p:blipFill>
         <p:spPr>
           <a:xfrm>
-            <a:off x="687388" y="4129238"/>
-            <a:ext cx="5626389" cy="2728762"/>
+            <a:off x="0" y="3800300"/>
+            <a:ext cx="6103080" cy="3057700"/>
+          </a:xfrm>
+          <a:prstGeom prst="rect">
+            <a:avLst/>
+          </a:prstGeom>
+        </p:spPr>
+      </p:pic>
+      <p:pic>
+        <p:nvPicPr>
+          <p:cNvPr id="7" name="Obrázok 6" descr="Obrázok, na ktorom je text, snímka obrazovky, písmo, diagram&#10;&#10;Automaticky generovaný popis">
+            <a:extLst>
+              <a:ext uri="{FF2B5EF4-FFF2-40B4-BE49-F238E27FC236}">
+                <a16:creationId xmlns:a16="http://schemas.microsoft.com/office/drawing/2014/main" id="{9A557382-11E1-87EE-A5D4-CD07C3A3D5E6}"/>
+              </a:ext>
+            </a:extLst>
+          </p:cNvPr>
+          <p:cNvPicPr>
+            <a:picLocks noChangeAspect="1"/>
+          </p:cNvPicPr>
+          <p:nvPr/>
+        </p:nvPicPr>
+        <p:blipFill>
+          <a:blip r:embed="rId4"/>
+          <a:stretch>
+            <a:fillRect/>
+          </a:stretch>
+        </p:blipFill>
+        <p:spPr>
+          <a:xfrm>
+            <a:off x="6103080" y="3907857"/>
+            <a:ext cx="6088920" cy="2934810"/>
           </a:xfrm>
           <a:prstGeom prst="rect">
             <a:avLst/>

</xml_diff>